<commit_message>
Began working on purge collection function. Also updated the game_data_schema.pptx and game_data_schema.pdf files with updated database structure.
</commit_message>
<xml_diff>
--- a/docs/game_data_schema.pptx
+++ b/docs/game_data_schema.pptx
@@ -288,7 +288,7 @@
           <a:p>
             <a:fld id="{6ECA5A38-FF59-8042-B4A4-E27C2E3C4B63}" type="datetimeFigureOut">
               <a:rPr lang="en-US" smtClean="0"/>
-              <a:t>3/1/15</a:t>
+              <a:t>3/20/15</a:t>
             </a:fld>
             <a:endParaRPr lang="en-US"/>
           </a:p>
@@ -458,7 +458,7 @@
           <a:p>
             <a:fld id="{6ECA5A38-FF59-8042-B4A4-E27C2E3C4B63}" type="datetimeFigureOut">
               <a:rPr lang="en-US" smtClean="0"/>
-              <a:t>3/1/15</a:t>
+              <a:t>3/20/15</a:t>
             </a:fld>
             <a:endParaRPr lang="en-US"/>
           </a:p>
@@ -638,7 +638,7 @@
           <a:p>
             <a:fld id="{6ECA5A38-FF59-8042-B4A4-E27C2E3C4B63}" type="datetimeFigureOut">
               <a:rPr lang="en-US" smtClean="0"/>
-              <a:t>3/1/15</a:t>
+              <a:t>3/20/15</a:t>
             </a:fld>
             <a:endParaRPr lang="en-US"/>
           </a:p>
@@ -808,7 +808,7 @@
           <a:p>
             <a:fld id="{6ECA5A38-FF59-8042-B4A4-E27C2E3C4B63}" type="datetimeFigureOut">
               <a:rPr lang="en-US" smtClean="0"/>
-              <a:t>3/1/15</a:t>
+              <a:t>3/20/15</a:t>
             </a:fld>
             <a:endParaRPr lang="en-US"/>
           </a:p>
@@ -1054,7 +1054,7 @@
           <a:p>
             <a:fld id="{6ECA5A38-FF59-8042-B4A4-E27C2E3C4B63}" type="datetimeFigureOut">
               <a:rPr lang="en-US" smtClean="0"/>
-              <a:t>3/1/15</a:t>
+              <a:t>3/20/15</a:t>
             </a:fld>
             <a:endParaRPr lang="en-US"/>
           </a:p>
@@ -1342,7 +1342,7 @@
           <a:p>
             <a:fld id="{6ECA5A38-FF59-8042-B4A4-E27C2E3C4B63}" type="datetimeFigureOut">
               <a:rPr lang="en-US" smtClean="0"/>
-              <a:t>3/1/15</a:t>
+              <a:t>3/20/15</a:t>
             </a:fld>
             <a:endParaRPr lang="en-US"/>
           </a:p>
@@ -1764,7 +1764,7 @@
           <a:p>
             <a:fld id="{6ECA5A38-FF59-8042-B4A4-E27C2E3C4B63}" type="datetimeFigureOut">
               <a:rPr lang="en-US" smtClean="0"/>
-              <a:t>3/1/15</a:t>
+              <a:t>3/20/15</a:t>
             </a:fld>
             <a:endParaRPr lang="en-US"/>
           </a:p>
@@ -1882,7 +1882,7 @@
           <a:p>
             <a:fld id="{6ECA5A38-FF59-8042-B4A4-E27C2E3C4B63}" type="datetimeFigureOut">
               <a:rPr lang="en-US" smtClean="0"/>
-              <a:t>3/1/15</a:t>
+              <a:t>3/20/15</a:t>
             </a:fld>
             <a:endParaRPr lang="en-US"/>
           </a:p>
@@ -1977,7 +1977,7 @@
           <a:p>
             <a:fld id="{6ECA5A38-FF59-8042-B4A4-E27C2E3C4B63}" type="datetimeFigureOut">
               <a:rPr lang="en-US" smtClean="0"/>
-              <a:t>3/1/15</a:t>
+              <a:t>3/20/15</a:t>
             </a:fld>
             <a:endParaRPr lang="en-US"/>
           </a:p>
@@ -2254,7 +2254,7 @@
           <a:p>
             <a:fld id="{6ECA5A38-FF59-8042-B4A4-E27C2E3C4B63}" type="datetimeFigureOut">
               <a:rPr lang="en-US" smtClean="0"/>
-              <a:t>3/1/15</a:t>
+              <a:t>3/20/15</a:t>
             </a:fld>
             <a:endParaRPr lang="en-US"/>
           </a:p>
@@ -2507,7 +2507,7 @@
           <a:p>
             <a:fld id="{6ECA5A38-FF59-8042-B4A4-E27C2E3C4B63}" type="datetimeFigureOut">
               <a:rPr lang="en-US" smtClean="0"/>
-              <a:t>3/1/15</a:t>
+              <a:t>3/20/15</a:t>
             </a:fld>
             <a:endParaRPr lang="en-US"/>
           </a:p>
@@ -2720,7 +2720,7 @@
           <a:p>
             <a:fld id="{6ECA5A38-FF59-8042-B4A4-E27C2E3C4B63}" type="datetimeFigureOut">
               <a:rPr lang="en-US" smtClean="0"/>
-              <a:t>3/1/15</a:t>
+              <a:t>3/20/15</a:t>
             </a:fld>
             <a:endParaRPr lang="en-US"/>
           </a:p>
@@ -3277,14 +3277,14 @@
       </p:sp>
       <p:sp>
         <p:nvSpPr>
-          <p:cNvPr id="9" name="TextBox 8"/>
+          <p:cNvPr id="11" name="TextBox 10"/>
           <p:cNvSpPr txBox="1"/>
           <p:nvPr/>
         </p:nvSpPr>
         <p:spPr>
           <a:xfrm>
-            <a:off x="710780" y="1751389"/>
-            <a:ext cx="1918952" cy="369332"/>
+            <a:off x="600455" y="1597307"/>
+            <a:ext cx="1024364" cy="276999"/>
           </a:xfrm>
           <a:prstGeom prst="rect">
             <a:avLst/>
@@ -3298,23 +3298,271 @@
           <a:lstStyle/>
           <a:p>
             <a:r>
-              <a:rPr lang="en-US" dirty="0" smtClean="0"/>
-              <a:t>‘meta’              dict</a:t>
-            </a:r>
-            <a:endParaRPr lang="en-US" dirty="0"/>
-          </a:p>
-        </p:txBody>
-      </p:sp>
-      <p:sp>
-        <p:nvSpPr>
-          <p:cNvPr id="10" name="Frame 9"/>
+              <a:rPr lang="en-US" sz="1200" dirty="0" smtClean="0"/>
+              <a:t>‘home_team’</a:t>
+            </a:r>
+            <a:endParaRPr lang="en-US" sz="1200" dirty="0"/>
+          </a:p>
+        </p:txBody>
+      </p:sp>
+      <p:sp>
+        <p:nvSpPr>
+          <p:cNvPr id="12" name="TextBox 11"/>
+          <p:cNvSpPr txBox="1"/>
+          <p:nvPr/>
+        </p:nvSpPr>
+        <p:spPr>
+          <a:xfrm>
+            <a:off x="589507" y="1829587"/>
+            <a:ext cx="992579" cy="276999"/>
+          </a:xfrm>
+          <a:prstGeom prst="rect">
+            <a:avLst/>
+          </a:prstGeom>
+          <a:noFill/>
+        </p:spPr>
+        <p:txBody>
+          <a:bodyPr wrap="none" rtlCol="0">
+            <a:spAutoFit/>
+          </a:bodyPr>
+          <a:lstStyle/>
+          <a:p>
+            <a:r>
+              <a:rPr lang="en-US" sz="1200" dirty="0" smtClean="0"/>
+              <a:t>‘away_team’</a:t>
+            </a:r>
+            <a:endParaRPr lang="en-US" sz="1200" dirty="0"/>
+          </a:p>
+        </p:txBody>
+      </p:sp>
+      <p:sp>
+        <p:nvSpPr>
+          <p:cNvPr id="13" name="TextBox 12"/>
+          <p:cNvSpPr txBox="1"/>
+          <p:nvPr/>
+        </p:nvSpPr>
+        <p:spPr>
+          <a:xfrm>
+            <a:off x="585413" y="2072343"/>
+            <a:ext cx="1114232" cy="276999"/>
+          </a:xfrm>
+          <a:prstGeom prst="rect">
+            <a:avLst/>
+          </a:prstGeom>
+          <a:noFill/>
+        </p:spPr>
+        <p:txBody>
+          <a:bodyPr wrap="none" rtlCol="0">
+            <a:spAutoFit/>
+          </a:bodyPr>
+          <a:lstStyle/>
+          <a:p>
+            <a:r>
+              <a:rPr lang="en-US" sz="1200" dirty="0" smtClean="0"/>
+              <a:t>‘playoff_game’</a:t>
+            </a:r>
+            <a:endParaRPr lang="en-US" sz="1200" dirty="0"/>
+          </a:p>
+        </p:txBody>
+      </p:sp>
+      <p:sp>
+        <p:nvSpPr>
+          <p:cNvPr id="14" name="TextBox 13"/>
+          <p:cNvSpPr txBox="1"/>
+          <p:nvPr/>
+        </p:nvSpPr>
+        <p:spPr>
+          <a:xfrm>
+            <a:off x="611643" y="2311304"/>
+            <a:ext cx="946067" cy="276999"/>
+          </a:xfrm>
+          <a:prstGeom prst="rect">
+            <a:avLst/>
+          </a:prstGeom>
+          <a:noFill/>
+        </p:spPr>
+        <p:txBody>
+          <a:bodyPr wrap="none" rtlCol="0">
+            <a:spAutoFit/>
+          </a:bodyPr>
+          <a:lstStyle/>
+          <a:p>
+            <a:r>
+              <a:rPr lang="en-US" sz="1200" dirty="0" smtClean="0"/>
+              <a:t>‘final_score’</a:t>
+            </a:r>
+            <a:endParaRPr lang="en-US" sz="1200" dirty="0"/>
+          </a:p>
+        </p:txBody>
+      </p:sp>
+      <p:sp>
+        <p:nvSpPr>
+          <p:cNvPr id="15" name="TextBox 14"/>
+          <p:cNvSpPr txBox="1"/>
+          <p:nvPr/>
+        </p:nvSpPr>
+        <p:spPr>
+          <a:xfrm>
+            <a:off x="631011" y="3016527"/>
+            <a:ext cx="710451" cy="276999"/>
+          </a:xfrm>
+          <a:prstGeom prst="rect">
+            <a:avLst/>
+          </a:prstGeom>
+          <a:noFill/>
+        </p:spPr>
+        <p:txBody>
+          <a:bodyPr wrap="none" rtlCol="0">
+            <a:spAutoFit/>
+          </a:bodyPr>
+          <a:lstStyle/>
+          <a:p>
+            <a:r>
+              <a:rPr lang="en-US" sz="1200" dirty="0" smtClean="0"/>
+              <a:t>‘scoring’</a:t>
+            </a:r>
+            <a:endParaRPr lang="en-US" sz="1200" dirty="0"/>
+          </a:p>
+        </p:txBody>
+      </p:sp>
+      <p:sp>
+        <p:nvSpPr>
+          <p:cNvPr id="17" name="TextBox 16"/>
+          <p:cNvSpPr txBox="1"/>
+          <p:nvPr/>
+        </p:nvSpPr>
+        <p:spPr>
+          <a:xfrm>
+            <a:off x="620630" y="3263773"/>
+            <a:ext cx="1033005" cy="276999"/>
+          </a:xfrm>
+          <a:prstGeom prst="rect">
+            <a:avLst/>
+          </a:prstGeom>
+          <a:noFill/>
+        </p:spPr>
+        <p:txBody>
+          <a:bodyPr wrap="none" rtlCol="0">
+            <a:spAutoFit/>
+          </a:bodyPr>
+          <a:lstStyle/>
+          <a:p>
+            <a:r>
+              <a:rPr lang="en-US" sz="1200" dirty="0" smtClean="0"/>
+              <a:t>‘four_factors’</a:t>
+            </a:r>
+            <a:endParaRPr lang="en-US" sz="1200" dirty="0"/>
+          </a:p>
+        </p:txBody>
+      </p:sp>
+      <p:sp>
+        <p:nvSpPr>
+          <p:cNvPr id="18" name="TextBox 17"/>
+          <p:cNvSpPr txBox="1"/>
+          <p:nvPr/>
+        </p:nvSpPr>
+        <p:spPr>
+          <a:xfrm>
+            <a:off x="600261" y="2543464"/>
+            <a:ext cx="967257" cy="276999"/>
+          </a:xfrm>
+          <a:prstGeom prst="rect">
+            <a:avLst/>
+          </a:prstGeom>
+          <a:noFill/>
+        </p:spPr>
+        <p:txBody>
+          <a:bodyPr wrap="none" rtlCol="0">
+            <a:spAutoFit/>
+          </a:bodyPr>
+          <a:lstStyle/>
+          <a:p>
+            <a:r>
+              <a:rPr lang="en-US" sz="1200" dirty="0" smtClean="0"/>
+              <a:t>‘attendance’</a:t>
+            </a:r>
+            <a:endParaRPr lang="en-US" sz="1200" dirty="0"/>
+          </a:p>
+        </p:txBody>
+      </p:sp>
+      <p:sp>
+        <p:nvSpPr>
+          <p:cNvPr id="19" name="TextBox 18"/>
+          <p:cNvSpPr txBox="1"/>
+          <p:nvPr/>
+        </p:nvSpPr>
+        <p:spPr>
+          <a:xfrm>
+            <a:off x="610505" y="2771854"/>
+            <a:ext cx="1173744" cy="276999"/>
+          </a:xfrm>
+          <a:prstGeom prst="rect">
+            <a:avLst/>
+          </a:prstGeom>
+          <a:noFill/>
+        </p:spPr>
+        <p:txBody>
+          <a:bodyPr wrap="none" rtlCol="0">
+            <a:spAutoFit/>
+          </a:bodyPr>
+          <a:lstStyle/>
+          <a:p>
+            <a:r>
+              <a:rPr lang="en-US" sz="1200" dirty="0" smtClean="0"/>
+              <a:t>‘time_of_game’</a:t>
+            </a:r>
+            <a:endParaRPr lang="en-US" sz="1200" dirty="0"/>
+          </a:p>
+        </p:txBody>
+      </p:sp>
+      <p:sp>
+        <p:nvSpPr>
+          <p:cNvPr id="20" name="TextBox 19"/>
+          <p:cNvSpPr txBox="1"/>
+          <p:nvPr/>
+        </p:nvSpPr>
+        <p:spPr>
+          <a:xfrm>
+            <a:off x="3545423" y="674852"/>
+            <a:ext cx="652530" cy="369332"/>
+          </a:xfrm>
+          <a:prstGeom prst="rect">
+            <a:avLst/>
+          </a:prstGeom>
+          <a:noFill/>
+        </p:spPr>
+        <p:txBody>
+          <a:bodyPr wrap="none" rtlCol="0">
+            <a:spAutoFit/>
+          </a:bodyPr>
+          <a:lstStyle/>
+          <a:p>
+            <a:r>
+              <a:rPr lang="en-US" b="1" dirty="0" smtClean="0">
+                <a:solidFill>
+                  <a:srgbClr val="0000FF"/>
+                </a:solidFill>
+              </a:rPr>
+              <a:t>KEYS</a:t>
+            </a:r>
+            <a:endParaRPr lang="en-US" b="1" dirty="0">
+              <a:solidFill>
+                <a:srgbClr val="0000FF"/>
+              </a:solidFill>
+            </a:endParaRPr>
+          </a:p>
+        </p:txBody>
+      </p:sp>
+      <p:sp>
+        <p:nvSpPr>
+          <p:cNvPr id="21" name="Frame 20"/>
           <p:cNvSpPr/>
           <p:nvPr/>
         </p:nvSpPr>
         <p:spPr>
           <a:xfrm>
-            <a:off x="664172" y="1704787"/>
-            <a:ext cx="803996" cy="466035"/>
+            <a:off x="674347" y="1647405"/>
+            <a:ext cx="896418" cy="203599"/>
           </a:xfrm>
           <a:prstGeom prst="frame">
             <a:avLst>
@@ -3351,14 +3599,322 @@
       </p:sp>
       <p:sp>
         <p:nvSpPr>
-          <p:cNvPr id="11" name="TextBox 10"/>
+          <p:cNvPr id="22" name="Frame 21"/>
+          <p:cNvSpPr/>
+          <p:nvPr/>
+        </p:nvSpPr>
+        <p:spPr>
+          <a:xfrm>
+            <a:off x="665354" y="1888278"/>
+            <a:ext cx="896418" cy="203599"/>
+          </a:xfrm>
+          <a:prstGeom prst="frame">
+            <a:avLst>
+              <a:gd name="adj1" fmla="val 0"/>
+            </a:avLst>
+          </a:prstGeom>
+        </p:spPr>
+        <p:style>
+          <a:lnRef idx="1">
+            <a:schemeClr val="accent1"/>
+          </a:lnRef>
+          <a:fillRef idx="3">
+            <a:schemeClr val="accent1"/>
+          </a:fillRef>
+          <a:effectRef idx="2">
+            <a:schemeClr val="accent1"/>
+          </a:effectRef>
+          <a:fontRef idx="minor">
+            <a:schemeClr val="lt1"/>
+          </a:fontRef>
+        </p:style>
+        <p:txBody>
+          <a:bodyPr rtlCol="0" anchor="ctr"/>
+          <a:lstStyle/>
+          <a:p>
+            <a:pPr algn="ctr"/>
+            <a:endParaRPr lang="en-US">
+              <a:solidFill>
+                <a:schemeClr val="tx1"/>
+              </a:solidFill>
+            </a:endParaRPr>
+          </a:p>
+        </p:txBody>
+      </p:sp>
+      <p:sp>
+        <p:nvSpPr>
+          <p:cNvPr id="23" name="Frame 22"/>
+          <p:cNvSpPr/>
+          <p:nvPr/>
+        </p:nvSpPr>
+        <p:spPr>
+          <a:xfrm>
+            <a:off x="665354" y="2120696"/>
+            <a:ext cx="947593" cy="216995"/>
+          </a:xfrm>
+          <a:prstGeom prst="frame">
+            <a:avLst>
+              <a:gd name="adj1" fmla="val 0"/>
+            </a:avLst>
+          </a:prstGeom>
+        </p:spPr>
+        <p:style>
+          <a:lnRef idx="1">
+            <a:schemeClr val="accent1"/>
+          </a:lnRef>
+          <a:fillRef idx="3">
+            <a:schemeClr val="accent1"/>
+          </a:fillRef>
+          <a:effectRef idx="2">
+            <a:schemeClr val="accent1"/>
+          </a:effectRef>
+          <a:fontRef idx="minor">
+            <a:schemeClr val="lt1"/>
+          </a:fontRef>
+        </p:style>
+        <p:txBody>
+          <a:bodyPr rtlCol="0" anchor="ctr"/>
+          <a:lstStyle/>
+          <a:p>
+            <a:pPr algn="ctr"/>
+            <a:endParaRPr lang="en-US">
+              <a:solidFill>
+                <a:schemeClr val="tx1"/>
+              </a:solidFill>
+            </a:endParaRPr>
+          </a:p>
+        </p:txBody>
+      </p:sp>
+      <p:sp>
+        <p:nvSpPr>
+          <p:cNvPr id="24" name="Frame 23"/>
+          <p:cNvSpPr/>
+          <p:nvPr/>
+        </p:nvSpPr>
+        <p:spPr>
+          <a:xfrm>
+            <a:off x="664171" y="2371684"/>
+            <a:ext cx="896418" cy="203599"/>
+          </a:xfrm>
+          <a:prstGeom prst="frame">
+            <a:avLst>
+              <a:gd name="adj1" fmla="val 0"/>
+            </a:avLst>
+          </a:prstGeom>
+        </p:spPr>
+        <p:style>
+          <a:lnRef idx="1">
+            <a:schemeClr val="accent1"/>
+          </a:lnRef>
+          <a:fillRef idx="3">
+            <a:schemeClr val="accent1"/>
+          </a:fillRef>
+          <a:effectRef idx="2">
+            <a:schemeClr val="accent1"/>
+          </a:effectRef>
+          <a:fontRef idx="minor">
+            <a:schemeClr val="lt1"/>
+          </a:fontRef>
+        </p:style>
+        <p:txBody>
+          <a:bodyPr rtlCol="0" anchor="ctr"/>
+          <a:lstStyle/>
+          <a:p>
+            <a:pPr algn="ctr"/>
+            <a:endParaRPr lang="en-US">
+              <a:solidFill>
+                <a:schemeClr val="tx1"/>
+              </a:solidFill>
+            </a:endParaRPr>
+          </a:p>
+        </p:txBody>
+      </p:sp>
+      <p:sp>
+        <p:nvSpPr>
+          <p:cNvPr id="27" name="Frame 26"/>
+          <p:cNvSpPr/>
+          <p:nvPr/>
+        </p:nvSpPr>
+        <p:spPr>
+          <a:xfrm>
+            <a:off x="678612" y="3078220"/>
+            <a:ext cx="571846" cy="215306"/>
+          </a:xfrm>
+          <a:prstGeom prst="frame">
+            <a:avLst>
+              <a:gd name="adj1" fmla="val 0"/>
+            </a:avLst>
+          </a:prstGeom>
+        </p:spPr>
+        <p:style>
+          <a:lnRef idx="1">
+            <a:schemeClr val="accent1"/>
+          </a:lnRef>
+          <a:fillRef idx="3">
+            <a:schemeClr val="accent1"/>
+          </a:fillRef>
+          <a:effectRef idx="2">
+            <a:schemeClr val="accent1"/>
+          </a:effectRef>
+          <a:fontRef idx="minor">
+            <a:schemeClr val="lt1"/>
+          </a:fontRef>
+        </p:style>
+        <p:txBody>
+          <a:bodyPr rtlCol="0" anchor="ctr"/>
+          <a:lstStyle/>
+          <a:p>
+            <a:pPr algn="ctr"/>
+            <a:endParaRPr lang="en-US">
+              <a:solidFill>
+                <a:schemeClr val="tx1"/>
+              </a:solidFill>
+            </a:endParaRPr>
+          </a:p>
+        </p:txBody>
+      </p:sp>
+      <p:sp>
+        <p:nvSpPr>
+          <p:cNvPr id="28" name="Frame 27"/>
+          <p:cNvSpPr/>
+          <p:nvPr/>
+        </p:nvSpPr>
+        <p:spPr>
+          <a:xfrm>
+            <a:off x="691187" y="3312879"/>
+            <a:ext cx="868387" cy="215306"/>
+          </a:xfrm>
+          <a:prstGeom prst="frame">
+            <a:avLst>
+              <a:gd name="adj1" fmla="val 0"/>
+            </a:avLst>
+          </a:prstGeom>
+        </p:spPr>
+        <p:style>
+          <a:lnRef idx="1">
+            <a:schemeClr val="accent1"/>
+          </a:lnRef>
+          <a:fillRef idx="3">
+            <a:schemeClr val="accent1"/>
+          </a:fillRef>
+          <a:effectRef idx="2">
+            <a:schemeClr val="accent1"/>
+          </a:effectRef>
+          <a:fontRef idx="minor">
+            <a:schemeClr val="lt1"/>
+          </a:fontRef>
+        </p:style>
+        <p:txBody>
+          <a:bodyPr rtlCol="0" anchor="ctr"/>
+          <a:lstStyle/>
+          <a:p>
+            <a:pPr algn="ctr"/>
+            <a:endParaRPr lang="en-US">
+              <a:solidFill>
+                <a:schemeClr val="tx1"/>
+              </a:solidFill>
+            </a:endParaRPr>
+          </a:p>
+        </p:txBody>
+      </p:sp>
+      <p:sp>
+        <p:nvSpPr>
+          <p:cNvPr id="29" name="Frame 28"/>
+          <p:cNvSpPr/>
+          <p:nvPr/>
+        </p:nvSpPr>
+        <p:spPr>
+          <a:xfrm>
+            <a:off x="664171" y="2597869"/>
+            <a:ext cx="868387" cy="215306"/>
+          </a:xfrm>
+          <a:prstGeom prst="frame">
+            <a:avLst>
+              <a:gd name="adj1" fmla="val 0"/>
+            </a:avLst>
+          </a:prstGeom>
+        </p:spPr>
+        <p:style>
+          <a:lnRef idx="1">
+            <a:schemeClr val="accent1"/>
+          </a:lnRef>
+          <a:fillRef idx="3">
+            <a:schemeClr val="accent1"/>
+          </a:fillRef>
+          <a:effectRef idx="2">
+            <a:schemeClr val="accent1"/>
+          </a:effectRef>
+          <a:fontRef idx="minor">
+            <a:schemeClr val="lt1"/>
+          </a:fontRef>
+        </p:style>
+        <p:txBody>
+          <a:bodyPr rtlCol="0" anchor="ctr"/>
+          <a:lstStyle/>
+          <a:p>
+            <a:pPr algn="ctr"/>
+            <a:endParaRPr lang="en-US">
+              <a:solidFill>
+                <a:schemeClr val="tx1"/>
+              </a:solidFill>
+            </a:endParaRPr>
+          </a:p>
+        </p:txBody>
+      </p:sp>
+      <p:sp>
+        <p:nvSpPr>
+          <p:cNvPr id="30" name="Frame 29"/>
+          <p:cNvSpPr/>
+          <p:nvPr/>
+        </p:nvSpPr>
+        <p:spPr>
+          <a:xfrm>
+            <a:off x="675445" y="2824373"/>
+            <a:ext cx="1018837" cy="201178"/>
+          </a:xfrm>
+          <a:prstGeom prst="frame">
+            <a:avLst>
+              <a:gd name="adj1" fmla="val 0"/>
+            </a:avLst>
+          </a:prstGeom>
+        </p:spPr>
+        <p:style>
+          <a:lnRef idx="1">
+            <a:schemeClr val="accent1"/>
+          </a:lnRef>
+          <a:fillRef idx="3">
+            <a:schemeClr val="accent1"/>
+          </a:fillRef>
+          <a:effectRef idx="2">
+            <a:schemeClr val="accent1"/>
+          </a:effectRef>
+          <a:fontRef idx="minor">
+            <a:schemeClr val="lt1"/>
+          </a:fontRef>
+        </p:style>
+        <p:txBody>
+          <a:bodyPr rtlCol="0" anchor="ctr"/>
+          <a:lstStyle/>
+          <a:p>
+            <a:pPr algn="ctr"/>
+            <a:endParaRPr lang="en-US">
+              <a:solidFill>
+                <a:schemeClr val="tx1"/>
+              </a:solidFill>
+            </a:endParaRPr>
+          </a:p>
+        </p:txBody>
+      </p:sp>
+      <p:sp>
+        <p:nvSpPr>
+          <p:cNvPr id="33" name="TextBox 32"/>
           <p:cNvSpPr txBox="1"/>
           <p:nvPr/>
         </p:nvSpPr>
         <p:spPr>
           <a:xfrm>
-            <a:off x="3417048" y="1038940"/>
-            <a:ext cx="1024364" cy="276999"/>
+            <a:off x="4764689" y="677539"/>
+            <a:ext cx="931039" cy="369332"/>
           </a:xfrm>
           <a:prstGeom prst="rect">
             <a:avLst/>
@@ -3372,23 +3928,31 @@
           <a:lstStyle/>
           <a:p>
             <a:r>
-              <a:rPr lang="en-US" sz="1200" dirty="0" smtClean="0"/>
-              <a:t>‘home_team’</a:t>
-            </a:r>
-            <a:endParaRPr lang="en-US" sz="1200" dirty="0"/>
-          </a:p>
-        </p:txBody>
-      </p:sp>
-      <p:sp>
-        <p:nvSpPr>
-          <p:cNvPr id="12" name="TextBox 11"/>
+              <a:rPr lang="en-US" b="1" dirty="0" smtClean="0">
+                <a:solidFill>
+                  <a:srgbClr val="0000FF"/>
+                </a:solidFill>
+              </a:rPr>
+              <a:t>VALUES</a:t>
+            </a:r>
+            <a:endParaRPr lang="en-US" b="1" dirty="0">
+              <a:solidFill>
+                <a:srgbClr val="0000FF"/>
+              </a:solidFill>
+            </a:endParaRPr>
+          </a:p>
+        </p:txBody>
+      </p:sp>
+      <p:sp>
+        <p:nvSpPr>
+          <p:cNvPr id="35" name="TextBox 34"/>
           <p:cNvSpPr txBox="1"/>
           <p:nvPr/>
         </p:nvSpPr>
         <p:spPr>
           <a:xfrm>
-            <a:off x="3417048" y="1259933"/>
-            <a:ext cx="992579" cy="276999"/>
+            <a:off x="2054309" y="1589151"/>
+            <a:ext cx="351378" cy="276999"/>
           </a:xfrm>
           <a:prstGeom prst="rect">
             <a:avLst/>
@@ -3403,22 +3967,21 @@
           <a:p>
             <a:r>
               <a:rPr lang="en-US" sz="1200" dirty="0" smtClean="0"/>
-              <a:t>‘away_team’</a:t>
-            </a:r>
-            <a:endParaRPr lang="en-US" sz="1200" dirty="0"/>
-          </a:p>
-        </p:txBody>
-      </p:sp>
-      <p:sp>
-        <p:nvSpPr>
-          <p:cNvPr id="13" name="TextBox 12"/>
+              <a:t>str</a:t>
+            </a:r>
+          </a:p>
+        </p:txBody>
+      </p:sp>
+      <p:sp>
+        <p:nvSpPr>
+          <p:cNvPr id="36" name="TextBox 35"/>
           <p:cNvSpPr txBox="1"/>
           <p:nvPr/>
         </p:nvSpPr>
         <p:spPr>
           <a:xfrm>
-            <a:off x="3413877" y="1504228"/>
-            <a:ext cx="1114232" cy="276999"/>
+            <a:off x="2055233" y="1822744"/>
+            <a:ext cx="351378" cy="276999"/>
           </a:xfrm>
           <a:prstGeom prst="rect">
             <a:avLst/>
@@ -3433,22 +3996,21 @@
           <a:p>
             <a:r>
               <a:rPr lang="en-US" sz="1200" dirty="0" smtClean="0"/>
-              <a:t>‘playoff_game’</a:t>
-            </a:r>
-            <a:endParaRPr lang="en-US" sz="1200" dirty="0"/>
-          </a:p>
-        </p:txBody>
-      </p:sp>
-      <p:sp>
-        <p:nvSpPr>
-          <p:cNvPr id="14" name="TextBox 13"/>
+              <a:t>str</a:t>
+            </a:r>
+          </a:p>
+        </p:txBody>
+      </p:sp>
+      <p:sp>
+        <p:nvSpPr>
+          <p:cNvPr id="37" name="TextBox 36"/>
           <p:cNvSpPr txBox="1"/>
           <p:nvPr/>
         </p:nvSpPr>
         <p:spPr>
           <a:xfrm>
-            <a:off x="3441291" y="1736872"/>
-            <a:ext cx="946067" cy="276999"/>
+            <a:off x="2052902" y="2065809"/>
+            <a:ext cx="463138" cy="276999"/>
           </a:xfrm>
           <a:prstGeom prst="rect">
             <a:avLst/>
@@ -3463,22 +4025,21 @@
           <a:p>
             <a:r>
               <a:rPr lang="en-US" sz="1200" dirty="0" smtClean="0"/>
-              <a:t>‘final_score’</a:t>
-            </a:r>
-            <a:endParaRPr lang="en-US" sz="1200" dirty="0"/>
-          </a:p>
-        </p:txBody>
-      </p:sp>
-      <p:sp>
-        <p:nvSpPr>
-          <p:cNvPr id="15" name="TextBox 14"/>
+              <a:t>bool</a:t>
+            </a:r>
+          </a:p>
+        </p:txBody>
+      </p:sp>
+      <p:sp>
+        <p:nvSpPr>
+          <p:cNvPr id="38" name="TextBox 37"/>
           <p:cNvSpPr txBox="1"/>
           <p:nvPr/>
         </p:nvSpPr>
         <p:spPr>
           <a:xfrm>
-            <a:off x="3447142" y="1969516"/>
-            <a:ext cx="710451" cy="276999"/>
+            <a:off x="2064998" y="2306150"/>
+            <a:ext cx="351378" cy="276999"/>
           </a:xfrm>
           <a:prstGeom prst="rect">
             <a:avLst/>
@@ -3493,22 +4054,21 @@
           <a:p>
             <a:r>
               <a:rPr lang="en-US" sz="1200" dirty="0" smtClean="0"/>
-              <a:t>‘scoring’</a:t>
-            </a:r>
-            <a:endParaRPr lang="en-US" sz="1200" dirty="0"/>
-          </a:p>
-        </p:txBody>
-      </p:sp>
-      <p:sp>
-        <p:nvSpPr>
-          <p:cNvPr id="17" name="TextBox 16"/>
+              <a:t>str</a:t>
+            </a:r>
+          </a:p>
+        </p:txBody>
+      </p:sp>
+      <p:sp>
+        <p:nvSpPr>
+          <p:cNvPr id="39" name="TextBox 38"/>
           <p:cNvSpPr txBox="1"/>
           <p:nvPr/>
         </p:nvSpPr>
         <p:spPr>
           <a:xfrm>
-            <a:off x="3436761" y="2227711"/>
-            <a:ext cx="1033005" cy="276999"/>
+            <a:off x="2052902" y="2978369"/>
+            <a:ext cx="417452" cy="276999"/>
           </a:xfrm>
           <a:prstGeom prst="rect">
             <a:avLst/>
@@ -3523,22 +4083,21 @@
           <a:p>
             <a:r>
               <a:rPr lang="en-US" sz="1200" dirty="0" smtClean="0"/>
-              <a:t>‘four_factors’</a:t>
-            </a:r>
-            <a:endParaRPr lang="en-US" sz="1200" dirty="0"/>
-          </a:p>
-        </p:txBody>
-      </p:sp>
-      <p:sp>
-        <p:nvSpPr>
-          <p:cNvPr id="18" name="TextBox 17"/>
+              <a:t>dict</a:t>
+            </a:r>
+          </a:p>
+        </p:txBody>
+      </p:sp>
+      <p:sp>
+        <p:nvSpPr>
+          <p:cNvPr id="40" name="TextBox 39"/>
           <p:cNvSpPr txBox="1"/>
           <p:nvPr/>
         </p:nvSpPr>
         <p:spPr>
           <a:xfrm>
-            <a:off x="3455984" y="2468020"/>
-            <a:ext cx="967257" cy="276999"/>
+            <a:off x="2054796" y="3258557"/>
+            <a:ext cx="417452" cy="276999"/>
           </a:xfrm>
           <a:prstGeom prst="rect">
             <a:avLst/>
@@ -3553,22 +4112,21 @@
           <a:p>
             <a:r>
               <a:rPr lang="en-US" sz="1200" dirty="0" smtClean="0"/>
-              <a:t>‘attendance’</a:t>
-            </a:r>
-            <a:endParaRPr lang="en-US" sz="1200" dirty="0"/>
-          </a:p>
-        </p:txBody>
-      </p:sp>
-      <p:sp>
-        <p:nvSpPr>
-          <p:cNvPr id="19" name="TextBox 18"/>
+              <a:t>dict</a:t>
+            </a:r>
+          </a:p>
+        </p:txBody>
+      </p:sp>
+      <p:sp>
+        <p:nvSpPr>
+          <p:cNvPr id="41" name="TextBox 40"/>
           <p:cNvSpPr txBox="1"/>
           <p:nvPr/>
         </p:nvSpPr>
         <p:spPr>
           <a:xfrm>
-            <a:off x="3444332" y="2718308"/>
-            <a:ext cx="1173744" cy="276999"/>
+            <a:off x="2070933" y="2539361"/>
+            <a:ext cx="352380" cy="276999"/>
           </a:xfrm>
           <a:prstGeom prst="rect">
             <a:avLst/>
@@ -3583,21 +4141,199 @@
           <a:p>
             <a:r>
               <a:rPr lang="en-US" sz="1200" dirty="0" smtClean="0"/>
-              <a:t>‘time_of_game’</a:t>
-            </a:r>
-            <a:endParaRPr lang="en-US" sz="1200" dirty="0"/>
-          </a:p>
-        </p:txBody>
-      </p:sp>
-      <p:sp>
-        <p:nvSpPr>
-          <p:cNvPr id="20" name="TextBox 19"/>
+              <a:t>int</a:t>
+            </a:r>
+          </a:p>
+        </p:txBody>
+      </p:sp>
+      <p:sp>
+        <p:nvSpPr>
+          <p:cNvPr id="42" name="TextBox 41"/>
           <p:cNvSpPr txBox="1"/>
           <p:nvPr/>
         </p:nvSpPr>
         <p:spPr>
           <a:xfrm>
-            <a:off x="3545423" y="674852"/>
+            <a:off x="2070933" y="2755779"/>
+            <a:ext cx="351378" cy="276999"/>
+          </a:xfrm>
+          <a:prstGeom prst="rect">
+            <a:avLst/>
+          </a:prstGeom>
+          <a:noFill/>
+        </p:spPr>
+        <p:txBody>
+          <a:bodyPr wrap="none" rtlCol="0">
+            <a:spAutoFit/>
+          </a:bodyPr>
+          <a:lstStyle/>
+          <a:p>
+            <a:r>
+              <a:rPr lang="en-US" sz="1200" dirty="0" smtClean="0"/>
+              <a:t>str</a:t>
+            </a:r>
+          </a:p>
+        </p:txBody>
+      </p:sp>
+      <p:sp>
+        <p:nvSpPr>
+          <p:cNvPr id="43" name="TextBox 42"/>
+          <p:cNvSpPr txBox="1"/>
+          <p:nvPr/>
+        </p:nvSpPr>
+        <p:spPr>
+          <a:xfrm>
+            <a:off x="104871" y="5045767"/>
+            <a:ext cx="2587329" cy="369332"/>
+          </a:xfrm>
+          <a:prstGeom prst="rect">
+            <a:avLst/>
+          </a:prstGeom>
+          <a:noFill/>
+        </p:spPr>
+        <p:txBody>
+          <a:bodyPr wrap="none" rtlCol="0">
+            <a:spAutoFit/>
+          </a:bodyPr>
+          <a:lstStyle/>
+          <a:p>
+            <a:r>
+              <a:rPr lang="en-US" dirty="0" smtClean="0"/>
+              <a:t>‘{}’.format(player)      dict</a:t>
+            </a:r>
+            <a:endParaRPr lang="en-US" dirty="0"/>
+          </a:p>
+        </p:txBody>
+      </p:sp>
+      <p:sp>
+        <p:nvSpPr>
+          <p:cNvPr id="44" name="Frame 43"/>
+          <p:cNvSpPr/>
+          <p:nvPr/>
+        </p:nvSpPr>
+        <p:spPr>
+          <a:xfrm>
+            <a:off x="157304" y="4973303"/>
+            <a:ext cx="1765295" cy="466035"/>
+          </a:xfrm>
+          <a:prstGeom prst="frame">
+            <a:avLst>
+              <a:gd name="adj1" fmla="val 0"/>
+            </a:avLst>
+          </a:prstGeom>
+        </p:spPr>
+        <p:style>
+          <a:lnRef idx="1">
+            <a:schemeClr val="accent1"/>
+          </a:lnRef>
+          <a:fillRef idx="3">
+            <a:schemeClr val="accent1"/>
+          </a:fillRef>
+          <a:effectRef idx="2">
+            <a:schemeClr val="accent1"/>
+          </a:effectRef>
+          <a:fontRef idx="minor">
+            <a:schemeClr val="lt1"/>
+          </a:fontRef>
+        </p:style>
+        <p:txBody>
+          <a:bodyPr rtlCol="0" anchor="ctr"/>
+          <a:lstStyle/>
+          <a:p>
+            <a:pPr algn="ctr"/>
+            <a:endParaRPr lang="en-US">
+              <a:solidFill>
+                <a:schemeClr val="tx1"/>
+              </a:solidFill>
+            </a:endParaRPr>
+          </a:p>
+        </p:txBody>
+      </p:sp>
+      <p:sp>
+        <p:nvSpPr>
+          <p:cNvPr id="45" name="TextBox 44"/>
+          <p:cNvSpPr txBox="1"/>
+          <p:nvPr/>
+        </p:nvSpPr>
+        <p:spPr>
+          <a:xfrm>
+            <a:off x="1265092" y="528439"/>
+            <a:ext cx="560558" cy="246221"/>
+          </a:xfrm>
+          <a:prstGeom prst="rect">
+            <a:avLst/>
+          </a:prstGeom>
+          <a:noFill/>
+        </p:spPr>
+        <p:txBody>
+          <a:bodyPr wrap="none" rtlCol="0">
+            <a:spAutoFit/>
+          </a:bodyPr>
+          <a:lstStyle/>
+          <a:p>
+            <a:r>
+              <a:rPr lang="en-US" sz="1000" dirty="0" smtClean="0">
+                <a:solidFill>
+                  <a:srgbClr val="008000"/>
+                </a:solidFill>
+              </a:rPr>
+              <a:t>Layer 1</a:t>
+            </a:r>
+            <a:endParaRPr lang="en-US" sz="1000" dirty="0">
+              <a:solidFill>
+                <a:srgbClr val="008000"/>
+              </a:solidFill>
+            </a:endParaRPr>
+          </a:p>
+        </p:txBody>
+      </p:sp>
+      <p:sp>
+        <p:nvSpPr>
+          <p:cNvPr id="46" name="TextBox 45"/>
+          <p:cNvSpPr txBox="1"/>
+          <p:nvPr/>
+        </p:nvSpPr>
+        <p:spPr>
+          <a:xfrm>
+            <a:off x="4247830" y="528439"/>
+            <a:ext cx="560558" cy="246221"/>
+          </a:xfrm>
+          <a:prstGeom prst="rect">
+            <a:avLst/>
+          </a:prstGeom>
+          <a:noFill/>
+        </p:spPr>
+        <p:txBody>
+          <a:bodyPr wrap="none" rtlCol="0">
+            <a:spAutoFit/>
+          </a:bodyPr>
+          <a:lstStyle/>
+          <a:p>
+            <a:r>
+              <a:rPr lang="en-US" sz="1000" dirty="0" smtClean="0">
+                <a:solidFill>
+                  <a:srgbClr val="008000"/>
+                </a:solidFill>
+              </a:rPr>
+              <a:t>Layer 2</a:t>
+            </a:r>
+            <a:endParaRPr lang="en-US" sz="1000" dirty="0">
+              <a:solidFill>
+                <a:srgbClr val="008000"/>
+              </a:solidFill>
+            </a:endParaRPr>
+          </a:p>
+        </p:txBody>
+      </p:sp>
+      <p:sp>
+        <p:nvSpPr>
+          <p:cNvPr id="47" name="TextBox 46"/>
+          <p:cNvSpPr txBox="1"/>
+          <p:nvPr/>
+        </p:nvSpPr>
+        <p:spPr>
+          <a:xfrm>
+            <a:off x="6436043" y="687440"/>
             <a:ext cx="652530" cy="369332"/>
           </a:xfrm>
           <a:prstGeom prst="rect">
@@ -3629,14 +4365,171 @@
       </p:sp>
       <p:sp>
         <p:nvSpPr>
-          <p:cNvPr id="21" name="Frame 20"/>
+          <p:cNvPr id="48" name="TextBox 47"/>
+          <p:cNvSpPr txBox="1"/>
+          <p:nvPr/>
+        </p:nvSpPr>
+        <p:spPr>
+          <a:xfrm>
+            <a:off x="7655309" y="690127"/>
+            <a:ext cx="931039" cy="369332"/>
+          </a:xfrm>
+          <a:prstGeom prst="rect">
+            <a:avLst/>
+          </a:prstGeom>
+          <a:noFill/>
+        </p:spPr>
+        <p:txBody>
+          <a:bodyPr wrap="none" rtlCol="0">
+            <a:spAutoFit/>
+          </a:bodyPr>
+          <a:lstStyle/>
+          <a:p>
+            <a:r>
+              <a:rPr lang="en-US" b="1" dirty="0" smtClean="0">
+                <a:solidFill>
+                  <a:srgbClr val="0000FF"/>
+                </a:solidFill>
+              </a:rPr>
+              <a:t>VALUES</a:t>
+            </a:r>
+            <a:endParaRPr lang="en-US" b="1" dirty="0">
+              <a:solidFill>
+                <a:srgbClr val="0000FF"/>
+              </a:solidFill>
+            </a:endParaRPr>
+          </a:p>
+        </p:txBody>
+      </p:sp>
+      <p:sp>
+        <p:nvSpPr>
+          <p:cNvPr id="49" name="TextBox 48"/>
+          <p:cNvSpPr txBox="1"/>
+          <p:nvPr/>
+        </p:nvSpPr>
+        <p:spPr>
+          <a:xfrm>
+            <a:off x="7138450" y="541027"/>
+            <a:ext cx="560558" cy="246221"/>
+          </a:xfrm>
+          <a:prstGeom prst="rect">
+            <a:avLst/>
+          </a:prstGeom>
+          <a:noFill/>
+        </p:spPr>
+        <p:txBody>
+          <a:bodyPr wrap="none" rtlCol="0">
+            <a:spAutoFit/>
+          </a:bodyPr>
+          <a:lstStyle/>
+          <a:p>
+            <a:r>
+              <a:rPr lang="en-US" sz="1000" dirty="0" smtClean="0">
+                <a:solidFill>
+                  <a:srgbClr val="008000"/>
+                </a:solidFill>
+              </a:rPr>
+              <a:t>Layer 3</a:t>
+            </a:r>
+            <a:endParaRPr lang="en-US" sz="1000" dirty="0">
+              <a:solidFill>
+                <a:srgbClr val="008000"/>
+              </a:solidFill>
+            </a:endParaRPr>
+          </a:p>
+        </p:txBody>
+      </p:sp>
+      <p:sp>
+        <p:nvSpPr>
+          <p:cNvPr id="50" name="TextBox 49"/>
+          <p:cNvSpPr txBox="1"/>
+          <p:nvPr/>
+        </p:nvSpPr>
+        <p:spPr>
+          <a:xfrm>
+            <a:off x="3545324" y="1247427"/>
+            <a:ext cx="1283036" cy="230832"/>
+          </a:xfrm>
+          <a:prstGeom prst="rect">
+            <a:avLst/>
+          </a:prstGeom>
+          <a:noFill/>
+        </p:spPr>
+        <p:txBody>
+          <a:bodyPr wrap="none" rtlCol="0">
+            <a:spAutoFit/>
+          </a:bodyPr>
+          <a:lstStyle/>
+          <a:p>
+            <a:r>
+              <a:rPr lang="en-US" sz="900" dirty="0" smtClean="0"/>
+              <a:t>‘{}’.format(team_short)</a:t>
+            </a:r>
+            <a:endParaRPr lang="en-US" sz="900" dirty="0"/>
+          </a:p>
+        </p:txBody>
+      </p:sp>
+      <p:sp>
+        <p:nvSpPr>
+          <p:cNvPr id="51" name="TextBox 50"/>
+          <p:cNvSpPr txBox="1"/>
+          <p:nvPr/>
+        </p:nvSpPr>
+        <p:spPr>
+          <a:xfrm>
+            <a:off x="4933510" y="1038940"/>
+            <a:ext cx="1379799" cy="646331"/>
+          </a:xfrm>
+          <a:prstGeom prst="rect">
+            <a:avLst/>
+          </a:prstGeom>
+          <a:noFill/>
+        </p:spPr>
+        <p:txBody>
+          <a:bodyPr wrap="none" rtlCol="0">
+            <a:spAutoFit/>
+          </a:bodyPr>
+          <a:lstStyle/>
+          <a:p>
+            <a:r>
+              <a:rPr lang="en-US" sz="900" dirty="0" smtClean="0"/>
+              <a:t>Dict  with 5 keys: </a:t>
+            </a:r>
+            <a:br>
+              <a:rPr lang="en-US" sz="900" dirty="0" smtClean="0"/>
+            </a:br>
+            <a:r>
+              <a:rPr lang="en-US" sz="900" dirty="0" smtClean="0"/>
+              <a:t>quarterly point totals, </a:t>
+            </a:r>
+            <a:br>
+              <a:rPr lang="en-US" sz="900" dirty="0" smtClean="0"/>
+            </a:br>
+            <a:r>
+              <a:rPr lang="en-US" sz="900" dirty="0" smtClean="0"/>
+              <a:t>trailed by total (q1,q2,q3,</a:t>
+            </a:r>
+            <a:br>
+              <a:rPr lang="en-US" sz="900" dirty="0" smtClean="0"/>
+            </a:br>
+            <a:r>
+              <a:rPr lang="en-US" sz="900" dirty="0" smtClean="0"/>
+              <a:t>q4,tot)</a:t>
+            </a:r>
+            <a:endParaRPr lang="en-US" sz="900" dirty="0"/>
+          </a:p>
+        </p:txBody>
+      </p:sp>
+      <p:sp>
+        <p:nvSpPr>
+          <p:cNvPr id="52" name="Frame 51"/>
           <p:cNvSpPr/>
           <p:nvPr/>
         </p:nvSpPr>
         <p:spPr>
           <a:xfrm>
-            <a:off x="3490940" y="1089038"/>
-            <a:ext cx="896418" cy="203599"/>
+            <a:off x="3582326" y="1235776"/>
+            <a:ext cx="1199425" cy="242484"/>
           </a:xfrm>
           <a:prstGeom prst="frame">
             <a:avLst>
@@ -3673,14 +4566,44 @@
       </p:sp>
       <p:sp>
         <p:nvSpPr>
-          <p:cNvPr id="22" name="Frame 21"/>
+          <p:cNvPr id="53" name="TextBox 52"/>
+          <p:cNvSpPr txBox="1"/>
+          <p:nvPr/>
+        </p:nvSpPr>
+        <p:spPr>
+          <a:xfrm>
+            <a:off x="3449609" y="2196559"/>
+            <a:ext cx="1283036" cy="230832"/>
+          </a:xfrm>
+          <a:prstGeom prst="rect">
+            <a:avLst/>
+          </a:prstGeom>
+          <a:noFill/>
+        </p:spPr>
+        <p:txBody>
+          <a:bodyPr wrap="none" rtlCol="0">
+            <a:spAutoFit/>
+          </a:bodyPr>
+          <a:lstStyle/>
+          <a:p>
+            <a:r>
+              <a:rPr lang="en-US" sz="900" dirty="0" smtClean="0"/>
+              <a:t>‘{}’.format(team_short)</a:t>
+            </a:r>
+            <a:endParaRPr lang="en-US" sz="900" dirty="0"/>
+          </a:p>
+        </p:txBody>
+      </p:sp>
+      <p:sp>
+        <p:nvSpPr>
+          <p:cNvPr id="54" name="Frame 53"/>
           <p:cNvSpPr/>
           <p:nvPr/>
         </p:nvSpPr>
         <p:spPr>
           <a:xfrm>
-            <a:off x="3492895" y="1318624"/>
-            <a:ext cx="896418" cy="203599"/>
+            <a:off x="3486611" y="2184908"/>
+            <a:ext cx="1199425" cy="242484"/>
           </a:xfrm>
           <a:prstGeom prst="frame">
             <a:avLst>
@@ -3717,1051 +4640,13 @@
       </p:sp>
       <p:sp>
         <p:nvSpPr>
-          <p:cNvPr id="23" name="Frame 22"/>
-          <p:cNvSpPr/>
-          <p:nvPr/>
-        </p:nvSpPr>
-        <p:spPr>
-          <a:xfrm>
-            <a:off x="3493818" y="1552581"/>
-            <a:ext cx="947593" cy="216995"/>
-          </a:xfrm>
-          <a:prstGeom prst="frame">
-            <a:avLst>
-              <a:gd name="adj1" fmla="val 0"/>
-            </a:avLst>
-          </a:prstGeom>
-        </p:spPr>
-        <p:style>
-          <a:lnRef idx="1">
-            <a:schemeClr val="accent1"/>
-          </a:lnRef>
-          <a:fillRef idx="3">
-            <a:schemeClr val="accent1"/>
-          </a:fillRef>
-          <a:effectRef idx="2">
-            <a:schemeClr val="accent1"/>
-          </a:effectRef>
-          <a:fontRef idx="minor">
-            <a:schemeClr val="lt1"/>
-          </a:fontRef>
-        </p:style>
-        <p:txBody>
-          <a:bodyPr rtlCol="0" anchor="ctr"/>
-          <a:lstStyle/>
-          <a:p>
-            <a:pPr algn="ctr"/>
-            <a:endParaRPr lang="en-US">
-              <a:solidFill>
-                <a:schemeClr val="tx1"/>
-              </a:solidFill>
-            </a:endParaRPr>
-          </a:p>
-        </p:txBody>
-      </p:sp>
-      <p:sp>
-        <p:nvSpPr>
-          <p:cNvPr id="24" name="Frame 23"/>
-          <p:cNvSpPr/>
-          <p:nvPr/>
-        </p:nvSpPr>
-        <p:spPr>
-          <a:xfrm>
-            <a:off x="3493819" y="1797252"/>
-            <a:ext cx="896418" cy="203599"/>
-          </a:xfrm>
-          <a:prstGeom prst="frame">
-            <a:avLst>
-              <a:gd name="adj1" fmla="val 0"/>
-            </a:avLst>
-          </a:prstGeom>
-        </p:spPr>
-        <p:style>
-          <a:lnRef idx="1">
-            <a:schemeClr val="accent1"/>
-          </a:lnRef>
-          <a:fillRef idx="3">
-            <a:schemeClr val="accent1"/>
-          </a:fillRef>
-          <a:effectRef idx="2">
-            <a:schemeClr val="accent1"/>
-          </a:effectRef>
-          <a:fontRef idx="minor">
-            <a:schemeClr val="lt1"/>
-          </a:fontRef>
-        </p:style>
-        <p:txBody>
-          <a:bodyPr rtlCol="0" anchor="ctr"/>
-          <a:lstStyle/>
-          <a:p>
-            <a:pPr algn="ctr"/>
-            <a:endParaRPr lang="en-US">
-              <a:solidFill>
-                <a:schemeClr val="tx1"/>
-              </a:solidFill>
-            </a:endParaRPr>
-          </a:p>
-        </p:txBody>
-      </p:sp>
-      <p:sp>
-        <p:nvSpPr>
-          <p:cNvPr id="27" name="Frame 26"/>
-          <p:cNvSpPr/>
-          <p:nvPr/>
-        </p:nvSpPr>
-        <p:spPr>
-          <a:xfrm>
-            <a:off x="3494743" y="2031209"/>
-            <a:ext cx="571846" cy="215306"/>
-          </a:xfrm>
-          <a:prstGeom prst="frame">
-            <a:avLst>
-              <a:gd name="adj1" fmla="val 0"/>
-            </a:avLst>
-          </a:prstGeom>
-        </p:spPr>
-        <p:style>
-          <a:lnRef idx="1">
-            <a:schemeClr val="accent1"/>
-          </a:lnRef>
-          <a:fillRef idx="3">
-            <a:schemeClr val="accent1"/>
-          </a:fillRef>
-          <a:effectRef idx="2">
-            <a:schemeClr val="accent1"/>
-          </a:effectRef>
-          <a:fontRef idx="minor">
-            <a:schemeClr val="lt1"/>
-          </a:fontRef>
-        </p:style>
-        <p:txBody>
-          <a:bodyPr rtlCol="0" anchor="ctr"/>
-          <a:lstStyle/>
-          <a:p>
-            <a:pPr algn="ctr"/>
-            <a:endParaRPr lang="en-US">
-              <a:solidFill>
-                <a:schemeClr val="tx1"/>
-              </a:solidFill>
-            </a:endParaRPr>
-          </a:p>
-        </p:txBody>
-      </p:sp>
-      <p:sp>
-        <p:nvSpPr>
-          <p:cNvPr id="28" name="Frame 27"/>
-          <p:cNvSpPr/>
-          <p:nvPr/>
-        </p:nvSpPr>
-        <p:spPr>
-          <a:xfrm>
-            <a:off x="3507318" y="2276817"/>
-            <a:ext cx="868387" cy="215306"/>
-          </a:xfrm>
-          <a:prstGeom prst="frame">
-            <a:avLst>
-              <a:gd name="adj1" fmla="val 0"/>
-            </a:avLst>
-          </a:prstGeom>
-        </p:spPr>
-        <p:style>
-          <a:lnRef idx="1">
-            <a:schemeClr val="accent1"/>
-          </a:lnRef>
-          <a:fillRef idx="3">
-            <a:schemeClr val="accent1"/>
-          </a:fillRef>
-          <a:effectRef idx="2">
-            <a:schemeClr val="accent1"/>
-          </a:effectRef>
-          <a:fontRef idx="minor">
-            <a:schemeClr val="lt1"/>
-          </a:fontRef>
-        </p:style>
-        <p:txBody>
-          <a:bodyPr rtlCol="0" anchor="ctr"/>
-          <a:lstStyle/>
-          <a:p>
-            <a:pPr algn="ctr"/>
-            <a:endParaRPr lang="en-US">
-              <a:solidFill>
-                <a:schemeClr val="tx1"/>
-              </a:solidFill>
-            </a:endParaRPr>
-          </a:p>
-        </p:txBody>
-      </p:sp>
-      <p:sp>
-        <p:nvSpPr>
-          <p:cNvPr id="29" name="Frame 28"/>
-          <p:cNvSpPr/>
-          <p:nvPr/>
-        </p:nvSpPr>
-        <p:spPr>
-          <a:xfrm>
-            <a:off x="3519894" y="2522425"/>
-            <a:ext cx="868387" cy="215306"/>
-          </a:xfrm>
-          <a:prstGeom prst="frame">
-            <a:avLst>
-              <a:gd name="adj1" fmla="val 0"/>
-            </a:avLst>
-          </a:prstGeom>
-        </p:spPr>
-        <p:style>
-          <a:lnRef idx="1">
-            <a:schemeClr val="accent1"/>
-          </a:lnRef>
-          <a:fillRef idx="3">
-            <a:schemeClr val="accent1"/>
-          </a:fillRef>
-          <a:effectRef idx="2">
-            <a:schemeClr val="accent1"/>
-          </a:effectRef>
-          <a:fontRef idx="minor">
-            <a:schemeClr val="lt1"/>
-          </a:fontRef>
-        </p:style>
-        <p:txBody>
-          <a:bodyPr rtlCol="0" anchor="ctr"/>
-          <a:lstStyle/>
-          <a:p>
-            <a:pPr algn="ctr"/>
-            <a:endParaRPr lang="en-US">
-              <a:solidFill>
-                <a:schemeClr val="tx1"/>
-              </a:solidFill>
-            </a:endParaRPr>
-          </a:p>
-        </p:txBody>
-      </p:sp>
-      <p:sp>
-        <p:nvSpPr>
-          <p:cNvPr id="30" name="Frame 29"/>
-          <p:cNvSpPr/>
-          <p:nvPr/>
-        </p:nvSpPr>
-        <p:spPr>
-          <a:xfrm>
-            <a:off x="3509272" y="2770827"/>
-            <a:ext cx="1018837" cy="201178"/>
-          </a:xfrm>
-          <a:prstGeom prst="frame">
-            <a:avLst>
-              <a:gd name="adj1" fmla="val 0"/>
-            </a:avLst>
-          </a:prstGeom>
-        </p:spPr>
-        <p:style>
-          <a:lnRef idx="1">
-            <a:schemeClr val="accent1"/>
-          </a:lnRef>
-          <a:fillRef idx="3">
-            <a:schemeClr val="accent1"/>
-          </a:fillRef>
-          <a:effectRef idx="2">
-            <a:schemeClr val="accent1"/>
-          </a:effectRef>
-          <a:fontRef idx="minor">
-            <a:schemeClr val="lt1"/>
-          </a:fontRef>
-        </p:style>
-        <p:txBody>
-          <a:bodyPr rtlCol="0" anchor="ctr"/>
-          <a:lstStyle/>
-          <a:p>
-            <a:pPr algn="ctr"/>
-            <a:endParaRPr lang="en-US">
-              <a:solidFill>
-                <a:schemeClr val="tx1"/>
-              </a:solidFill>
-            </a:endParaRPr>
-          </a:p>
-        </p:txBody>
-      </p:sp>
-      <p:sp>
-        <p:nvSpPr>
-          <p:cNvPr id="33" name="TextBox 32"/>
-          <p:cNvSpPr txBox="1"/>
-          <p:nvPr/>
-        </p:nvSpPr>
-        <p:spPr>
-          <a:xfrm>
-            <a:off x="4764689" y="677539"/>
-            <a:ext cx="931039" cy="369332"/>
-          </a:xfrm>
-          <a:prstGeom prst="rect">
-            <a:avLst/>
-          </a:prstGeom>
-          <a:noFill/>
-        </p:spPr>
-        <p:txBody>
-          <a:bodyPr wrap="none" rtlCol="0">
-            <a:spAutoFit/>
-          </a:bodyPr>
-          <a:lstStyle/>
-          <a:p>
-            <a:r>
-              <a:rPr lang="en-US" b="1" dirty="0" smtClean="0">
-                <a:solidFill>
-                  <a:srgbClr val="0000FF"/>
-                </a:solidFill>
-              </a:rPr>
-              <a:t>VALUES</a:t>
-            </a:r>
-            <a:endParaRPr lang="en-US" b="1" dirty="0">
-              <a:solidFill>
-                <a:srgbClr val="0000FF"/>
-              </a:solidFill>
-            </a:endParaRPr>
-          </a:p>
-        </p:txBody>
-      </p:sp>
-      <p:sp>
-        <p:nvSpPr>
-          <p:cNvPr id="34" name="Left Brace 33"/>
-          <p:cNvSpPr/>
-          <p:nvPr/>
-        </p:nvSpPr>
-        <p:spPr>
-          <a:xfrm>
-            <a:off x="2629732" y="1112341"/>
-            <a:ext cx="807029" cy="1859664"/>
-          </a:xfrm>
-          <a:prstGeom prst="leftBrace">
-            <a:avLst>
-              <a:gd name="adj1" fmla="val 8333"/>
-              <a:gd name="adj2" fmla="val 46867"/>
-            </a:avLst>
-          </a:prstGeom>
-        </p:spPr>
-        <p:style>
-          <a:lnRef idx="2">
-            <a:schemeClr val="accent1"/>
-          </a:lnRef>
-          <a:fillRef idx="0">
-            <a:schemeClr val="accent1"/>
-          </a:fillRef>
-          <a:effectRef idx="1">
-            <a:schemeClr val="accent1"/>
-          </a:effectRef>
-          <a:fontRef idx="minor">
-            <a:schemeClr val="tx1"/>
-          </a:fontRef>
-        </p:style>
-        <p:txBody>
-          <a:bodyPr rtlCol="0" anchor="ctr"/>
-          <a:lstStyle/>
-          <a:p>
-            <a:pPr algn="ctr"/>
-            <a:endParaRPr lang="en-US"/>
-          </a:p>
-        </p:txBody>
-      </p:sp>
-      <p:sp>
-        <p:nvSpPr>
-          <p:cNvPr id="35" name="TextBox 34"/>
-          <p:cNvSpPr txBox="1"/>
-          <p:nvPr/>
-        </p:nvSpPr>
-        <p:spPr>
-          <a:xfrm>
-            <a:off x="5057018" y="1030784"/>
-            <a:ext cx="351378" cy="276999"/>
-          </a:xfrm>
-          <a:prstGeom prst="rect">
-            <a:avLst/>
-          </a:prstGeom>
-          <a:noFill/>
-        </p:spPr>
-        <p:txBody>
-          <a:bodyPr wrap="none" rtlCol="0">
-            <a:spAutoFit/>
-          </a:bodyPr>
-          <a:lstStyle/>
-          <a:p>
-            <a:r>
-              <a:rPr lang="en-US" sz="1200" dirty="0" smtClean="0"/>
-              <a:t>str</a:t>
-            </a:r>
-          </a:p>
-        </p:txBody>
-      </p:sp>
-      <p:sp>
-        <p:nvSpPr>
-          <p:cNvPr id="36" name="TextBox 35"/>
-          <p:cNvSpPr txBox="1"/>
-          <p:nvPr/>
-        </p:nvSpPr>
-        <p:spPr>
-          <a:xfrm>
-            <a:off x="5057942" y="1253090"/>
-            <a:ext cx="351378" cy="276999"/>
-          </a:xfrm>
-          <a:prstGeom prst="rect">
-            <a:avLst/>
-          </a:prstGeom>
-          <a:noFill/>
-        </p:spPr>
-        <p:txBody>
-          <a:bodyPr wrap="none" rtlCol="0">
-            <a:spAutoFit/>
-          </a:bodyPr>
-          <a:lstStyle/>
-          <a:p>
-            <a:r>
-              <a:rPr lang="en-US" sz="1200" dirty="0" smtClean="0"/>
-              <a:t>str</a:t>
-            </a:r>
-          </a:p>
-        </p:txBody>
-      </p:sp>
-      <p:sp>
-        <p:nvSpPr>
-          <p:cNvPr id="37" name="TextBox 36"/>
-          <p:cNvSpPr txBox="1"/>
-          <p:nvPr/>
-        </p:nvSpPr>
-        <p:spPr>
-          <a:xfrm>
-            <a:off x="5034638" y="1497694"/>
-            <a:ext cx="463138" cy="276999"/>
-          </a:xfrm>
-          <a:prstGeom prst="rect">
-            <a:avLst/>
-          </a:prstGeom>
-          <a:noFill/>
-        </p:spPr>
-        <p:txBody>
-          <a:bodyPr wrap="none" rtlCol="0">
-            <a:spAutoFit/>
-          </a:bodyPr>
-          <a:lstStyle/>
-          <a:p>
-            <a:r>
-              <a:rPr lang="en-US" sz="1200" dirty="0" smtClean="0"/>
-              <a:t>bool</a:t>
-            </a:r>
-          </a:p>
-        </p:txBody>
-      </p:sp>
-      <p:sp>
-        <p:nvSpPr>
-          <p:cNvPr id="38" name="TextBox 37"/>
-          <p:cNvSpPr txBox="1"/>
-          <p:nvPr/>
-        </p:nvSpPr>
-        <p:spPr>
-          <a:xfrm>
-            <a:off x="5058866" y="1731718"/>
-            <a:ext cx="351378" cy="276999"/>
-          </a:xfrm>
-          <a:prstGeom prst="rect">
-            <a:avLst/>
-          </a:prstGeom>
-          <a:noFill/>
-        </p:spPr>
-        <p:txBody>
-          <a:bodyPr wrap="none" rtlCol="0">
-            <a:spAutoFit/>
-          </a:bodyPr>
-          <a:lstStyle/>
-          <a:p>
-            <a:r>
-              <a:rPr lang="en-US" sz="1200" dirty="0" smtClean="0"/>
-              <a:t>str</a:t>
-            </a:r>
-          </a:p>
-        </p:txBody>
-      </p:sp>
-      <p:sp>
-        <p:nvSpPr>
-          <p:cNvPr id="39" name="TextBox 38"/>
-          <p:cNvSpPr txBox="1"/>
-          <p:nvPr/>
-        </p:nvSpPr>
-        <p:spPr>
-          <a:xfrm>
-            <a:off x="5049949" y="1962363"/>
-            <a:ext cx="417452" cy="276999"/>
-          </a:xfrm>
-          <a:prstGeom prst="rect">
-            <a:avLst/>
-          </a:prstGeom>
-          <a:noFill/>
-        </p:spPr>
-        <p:txBody>
-          <a:bodyPr wrap="none" rtlCol="0">
-            <a:spAutoFit/>
-          </a:bodyPr>
-          <a:lstStyle/>
-          <a:p>
-            <a:r>
-              <a:rPr lang="en-US" sz="1200" dirty="0" smtClean="0"/>
-              <a:t>dict</a:t>
-            </a:r>
-          </a:p>
-        </p:txBody>
-      </p:sp>
-      <p:sp>
-        <p:nvSpPr>
-          <p:cNvPr id="40" name="TextBox 39"/>
-          <p:cNvSpPr txBox="1"/>
-          <p:nvPr/>
-        </p:nvSpPr>
-        <p:spPr>
-          <a:xfrm>
-            <a:off x="5043344" y="2229960"/>
-            <a:ext cx="417452" cy="276999"/>
-          </a:xfrm>
-          <a:prstGeom prst="rect">
-            <a:avLst/>
-          </a:prstGeom>
-          <a:noFill/>
-        </p:spPr>
-        <p:txBody>
-          <a:bodyPr wrap="none" rtlCol="0">
-            <a:spAutoFit/>
-          </a:bodyPr>
-          <a:lstStyle/>
-          <a:p>
-            <a:r>
-              <a:rPr lang="en-US" sz="1200" dirty="0" smtClean="0"/>
-              <a:t>dict</a:t>
-            </a:r>
-          </a:p>
-        </p:txBody>
-      </p:sp>
-      <p:sp>
-        <p:nvSpPr>
-          <p:cNvPr id="41" name="TextBox 40"/>
-          <p:cNvSpPr txBox="1"/>
-          <p:nvPr/>
-        </p:nvSpPr>
-        <p:spPr>
-          <a:xfrm>
-            <a:off x="5090876" y="2463917"/>
-            <a:ext cx="352380" cy="276999"/>
-          </a:xfrm>
-          <a:prstGeom prst="rect">
-            <a:avLst/>
-          </a:prstGeom>
-          <a:noFill/>
-        </p:spPr>
-        <p:txBody>
-          <a:bodyPr wrap="none" rtlCol="0">
-            <a:spAutoFit/>
-          </a:bodyPr>
-          <a:lstStyle/>
-          <a:p>
-            <a:r>
-              <a:rPr lang="en-US" sz="1200" dirty="0" smtClean="0"/>
-              <a:t>int</a:t>
-            </a:r>
-          </a:p>
-        </p:txBody>
-      </p:sp>
-      <p:sp>
-        <p:nvSpPr>
-          <p:cNvPr id="42" name="TextBox 41"/>
-          <p:cNvSpPr txBox="1"/>
-          <p:nvPr/>
-        </p:nvSpPr>
-        <p:spPr>
-          <a:xfrm>
-            <a:off x="5090876" y="2702233"/>
-            <a:ext cx="351378" cy="276999"/>
-          </a:xfrm>
-          <a:prstGeom prst="rect">
-            <a:avLst/>
-          </a:prstGeom>
-          <a:noFill/>
-        </p:spPr>
-        <p:txBody>
-          <a:bodyPr wrap="none" rtlCol="0">
-            <a:spAutoFit/>
-          </a:bodyPr>
-          <a:lstStyle/>
-          <a:p>
-            <a:r>
-              <a:rPr lang="en-US" sz="1200" dirty="0" smtClean="0"/>
-              <a:t>str</a:t>
-            </a:r>
-          </a:p>
-        </p:txBody>
-      </p:sp>
-      <p:sp>
-        <p:nvSpPr>
-          <p:cNvPr id="43" name="TextBox 42"/>
-          <p:cNvSpPr txBox="1"/>
-          <p:nvPr/>
-        </p:nvSpPr>
-        <p:spPr>
-          <a:xfrm>
-            <a:off x="104871" y="5045767"/>
-            <a:ext cx="2587329" cy="369332"/>
-          </a:xfrm>
-          <a:prstGeom prst="rect">
-            <a:avLst/>
-          </a:prstGeom>
-          <a:noFill/>
-        </p:spPr>
-        <p:txBody>
-          <a:bodyPr wrap="none" rtlCol="0">
-            <a:spAutoFit/>
-          </a:bodyPr>
-          <a:lstStyle/>
-          <a:p>
-            <a:r>
-              <a:rPr lang="en-US" dirty="0" smtClean="0"/>
-              <a:t>‘{}’.format(player)      dict</a:t>
-            </a:r>
-            <a:endParaRPr lang="en-US" dirty="0"/>
-          </a:p>
-        </p:txBody>
-      </p:sp>
-      <p:sp>
-        <p:nvSpPr>
-          <p:cNvPr id="44" name="Frame 43"/>
-          <p:cNvSpPr/>
-          <p:nvPr/>
-        </p:nvSpPr>
-        <p:spPr>
-          <a:xfrm>
-            <a:off x="157304" y="4973303"/>
-            <a:ext cx="1765295" cy="466035"/>
-          </a:xfrm>
-          <a:prstGeom prst="frame">
-            <a:avLst>
-              <a:gd name="adj1" fmla="val 0"/>
-            </a:avLst>
-          </a:prstGeom>
-        </p:spPr>
-        <p:style>
-          <a:lnRef idx="1">
-            <a:schemeClr val="accent1"/>
-          </a:lnRef>
-          <a:fillRef idx="3">
-            <a:schemeClr val="accent1"/>
-          </a:fillRef>
-          <a:effectRef idx="2">
-            <a:schemeClr val="accent1"/>
-          </a:effectRef>
-          <a:fontRef idx="minor">
-            <a:schemeClr val="lt1"/>
-          </a:fontRef>
-        </p:style>
-        <p:txBody>
-          <a:bodyPr rtlCol="0" anchor="ctr"/>
-          <a:lstStyle/>
-          <a:p>
-            <a:pPr algn="ctr"/>
-            <a:endParaRPr lang="en-US">
-              <a:solidFill>
-                <a:schemeClr val="tx1"/>
-              </a:solidFill>
-            </a:endParaRPr>
-          </a:p>
-        </p:txBody>
-      </p:sp>
-      <p:sp>
-        <p:nvSpPr>
-          <p:cNvPr id="45" name="TextBox 44"/>
-          <p:cNvSpPr txBox="1"/>
-          <p:nvPr/>
-        </p:nvSpPr>
-        <p:spPr>
-          <a:xfrm>
-            <a:off x="1265092" y="528439"/>
-            <a:ext cx="560558" cy="246221"/>
-          </a:xfrm>
-          <a:prstGeom prst="rect">
-            <a:avLst/>
-          </a:prstGeom>
-          <a:noFill/>
-        </p:spPr>
-        <p:txBody>
-          <a:bodyPr wrap="none" rtlCol="0">
-            <a:spAutoFit/>
-          </a:bodyPr>
-          <a:lstStyle/>
-          <a:p>
-            <a:r>
-              <a:rPr lang="en-US" sz="1000" dirty="0" smtClean="0">
-                <a:solidFill>
-                  <a:srgbClr val="008000"/>
-                </a:solidFill>
-              </a:rPr>
-              <a:t>Layer 1</a:t>
-            </a:r>
-            <a:endParaRPr lang="en-US" sz="1000" dirty="0">
-              <a:solidFill>
-                <a:srgbClr val="008000"/>
-              </a:solidFill>
-            </a:endParaRPr>
-          </a:p>
-        </p:txBody>
-      </p:sp>
-      <p:sp>
-        <p:nvSpPr>
-          <p:cNvPr id="46" name="TextBox 45"/>
-          <p:cNvSpPr txBox="1"/>
-          <p:nvPr/>
-        </p:nvSpPr>
-        <p:spPr>
-          <a:xfrm>
-            <a:off x="4247830" y="528439"/>
-            <a:ext cx="560558" cy="246221"/>
-          </a:xfrm>
-          <a:prstGeom prst="rect">
-            <a:avLst/>
-          </a:prstGeom>
-          <a:noFill/>
-        </p:spPr>
-        <p:txBody>
-          <a:bodyPr wrap="none" rtlCol="0">
-            <a:spAutoFit/>
-          </a:bodyPr>
-          <a:lstStyle/>
-          <a:p>
-            <a:r>
-              <a:rPr lang="en-US" sz="1000" dirty="0" smtClean="0">
-                <a:solidFill>
-                  <a:srgbClr val="008000"/>
-                </a:solidFill>
-              </a:rPr>
-              <a:t>Layer 2</a:t>
-            </a:r>
-            <a:endParaRPr lang="en-US" sz="1000" dirty="0">
-              <a:solidFill>
-                <a:srgbClr val="008000"/>
-              </a:solidFill>
-            </a:endParaRPr>
-          </a:p>
-        </p:txBody>
-      </p:sp>
-      <p:sp>
-        <p:nvSpPr>
-          <p:cNvPr id="47" name="TextBox 46"/>
-          <p:cNvSpPr txBox="1"/>
-          <p:nvPr/>
-        </p:nvSpPr>
-        <p:spPr>
-          <a:xfrm>
-            <a:off x="6436043" y="687440"/>
-            <a:ext cx="652530" cy="369332"/>
-          </a:xfrm>
-          <a:prstGeom prst="rect">
-            <a:avLst/>
-          </a:prstGeom>
-          <a:noFill/>
-        </p:spPr>
-        <p:txBody>
-          <a:bodyPr wrap="none" rtlCol="0">
-            <a:spAutoFit/>
-          </a:bodyPr>
-          <a:lstStyle/>
-          <a:p>
-            <a:r>
-              <a:rPr lang="en-US" b="1" dirty="0" smtClean="0">
-                <a:solidFill>
-                  <a:srgbClr val="0000FF"/>
-                </a:solidFill>
-              </a:rPr>
-              <a:t>KEYS</a:t>
-            </a:r>
-            <a:endParaRPr lang="en-US" b="1" dirty="0">
-              <a:solidFill>
-                <a:srgbClr val="0000FF"/>
-              </a:solidFill>
-            </a:endParaRPr>
-          </a:p>
-        </p:txBody>
-      </p:sp>
-      <p:sp>
-        <p:nvSpPr>
-          <p:cNvPr id="48" name="TextBox 47"/>
-          <p:cNvSpPr txBox="1"/>
-          <p:nvPr/>
-        </p:nvSpPr>
-        <p:spPr>
-          <a:xfrm>
-            <a:off x="7655309" y="690127"/>
-            <a:ext cx="931039" cy="369332"/>
-          </a:xfrm>
-          <a:prstGeom prst="rect">
-            <a:avLst/>
-          </a:prstGeom>
-          <a:noFill/>
-        </p:spPr>
-        <p:txBody>
-          <a:bodyPr wrap="none" rtlCol="0">
-            <a:spAutoFit/>
-          </a:bodyPr>
-          <a:lstStyle/>
-          <a:p>
-            <a:r>
-              <a:rPr lang="en-US" b="1" dirty="0" smtClean="0">
-                <a:solidFill>
-                  <a:srgbClr val="0000FF"/>
-                </a:solidFill>
-              </a:rPr>
-              <a:t>VALUES</a:t>
-            </a:r>
-            <a:endParaRPr lang="en-US" b="1" dirty="0">
-              <a:solidFill>
-                <a:srgbClr val="0000FF"/>
-              </a:solidFill>
-            </a:endParaRPr>
-          </a:p>
-        </p:txBody>
-      </p:sp>
-      <p:sp>
-        <p:nvSpPr>
-          <p:cNvPr id="49" name="TextBox 48"/>
-          <p:cNvSpPr txBox="1"/>
-          <p:nvPr/>
-        </p:nvSpPr>
-        <p:spPr>
-          <a:xfrm>
-            <a:off x="7138450" y="541027"/>
-            <a:ext cx="560558" cy="246221"/>
-          </a:xfrm>
-          <a:prstGeom prst="rect">
-            <a:avLst/>
-          </a:prstGeom>
-          <a:noFill/>
-        </p:spPr>
-        <p:txBody>
-          <a:bodyPr wrap="none" rtlCol="0">
-            <a:spAutoFit/>
-          </a:bodyPr>
-          <a:lstStyle/>
-          <a:p>
-            <a:r>
-              <a:rPr lang="en-US" sz="1000" dirty="0" smtClean="0">
-                <a:solidFill>
-                  <a:srgbClr val="008000"/>
-                </a:solidFill>
-              </a:rPr>
-              <a:t>Layer 3</a:t>
-            </a:r>
-            <a:endParaRPr lang="en-US" sz="1000" dirty="0">
-              <a:solidFill>
-                <a:srgbClr val="008000"/>
-              </a:solidFill>
-            </a:endParaRPr>
-          </a:p>
-        </p:txBody>
-      </p:sp>
-      <p:sp>
-        <p:nvSpPr>
-          <p:cNvPr id="50" name="TextBox 49"/>
-          <p:cNvSpPr txBox="1"/>
-          <p:nvPr/>
-        </p:nvSpPr>
-        <p:spPr>
-          <a:xfrm>
-            <a:off x="6250843" y="1437165"/>
-            <a:ext cx="1283036" cy="230832"/>
-          </a:xfrm>
-          <a:prstGeom prst="rect">
-            <a:avLst/>
-          </a:prstGeom>
-          <a:noFill/>
-        </p:spPr>
-        <p:txBody>
-          <a:bodyPr wrap="none" rtlCol="0">
-            <a:spAutoFit/>
-          </a:bodyPr>
-          <a:lstStyle/>
-          <a:p>
-            <a:r>
-              <a:rPr lang="en-US" sz="900" dirty="0" smtClean="0"/>
-              <a:t>‘{}’.format(team_short)</a:t>
-            </a:r>
-            <a:endParaRPr lang="en-US" sz="900" dirty="0"/>
-          </a:p>
-        </p:txBody>
-      </p:sp>
-      <p:sp>
-        <p:nvSpPr>
-          <p:cNvPr id="51" name="TextBox 50"/>
-          <p:cNvSpPr txBox="1"/>
-          <p:nvPr/>
-        </p:nvSpPr>
-        <p:spPr>
-          <a:xfrm>
-            <a:off x="7686033" y="1244647"/>
-            <a:ext cx="1379799" cy="646331"/>
-          </a:xfrm>
-          <a:prstGeom prst="rect">
-            <a:avLst/>
-          </a:prstGeom>
-          <a:noFill/>
-        </p:spPr>
-        <p:txBody>
-          <a:bodyPr wrap="none" rtlCol="0">
-            <a:spAutoFit/>
-          </a:bodyPr>
-          <a:lstStyle/>
-          <a:p>
-            <a:r>
-              <a:rPr lang="en-US" sz="900" dirty="0" smtClean="0"/>
-              <a:t>Dict  with 5 keys: </a:t>
-            </a:r>
-            <a:br>
-              <a:rPr lang="en-US" sz="900" dirty="0" smtClean="0"/>
-            </a:br>
-            <a:r>
-              <a:rPr lang="en-US" sz="900" dirty="0" smtClean="0"/>
-              <a:t>quarterly point totals, </a:t>
-            </a:r>
-            <a:br>
-              <a:rPr lang="en-US" sz="900" dirty="0" smtClean="0"/>
-            </a:br>
-            <a:r>
-              <a:rPr lang="en-US" sz="900" dirty="0" smtClean="0"/>
-              <a:t>trailed by total (q1,q2,q3,</a:t>
-            </a:r>
-            <a:br>
-              <a:rPr lang="en-US" sz="900" dirty="0" smtClean="0"/>
-            </a:br>
-            <a:r>
-              <a:rPr lang="en-US" sz="900" dirty="0" smtClean="0"/>
-              <a:t>q4,tot)</a:t>
-            </a:r>
-            <a:endParaRPr lang="en-US" sz="900" dirty="0"/>
-          </a:p>
-        </p:txBody>
-      </p:sp>
-      <p:sp>
-        <p:nvSpPr>
-          <p:cNvPr id="52" name="Frame 51"/>
-          <p:cNvSpPr/>
-          <p:nvPr/>
-        </p:nvSpPr>
-        <p:spPr>
-          <a:xfrm>
-            <a:off x="6287845" y="1425514"/>
-            <a:ext cx="1199425" cy="242484"/>
-          </a:xfrm>
-          <a:prstGeom prst="frame">
-            <a:avLst>
-              <a:gd name="adj1" fmla="val 0"/>
-            </a:avLst>
-          </a:prstGeom>
-        </p:spPr>
-        <p:style>
-          <a:lnRef idx="1">
-            <a:schemeClr val="accent1"/>
-          </a:lnRef>
-          <a:fillRef idx="3">
-            <a:schemeClr val="accent1"/>
-          </a:fillRef>
-          <a:effectRef idx="2">
-            <a:schemeClr val="accent1"/>
-          </a:effectRef>
-          <a:fontRef idx="minor">
-            <a:schemeClr val="lt1"/>
-          </a:fontRef>
-        </p:style>
-        <p:txBody>
-          <a:bodyPr rtlCol="0" anchor="ctr"/>
-          <a:lstStyle/>
-          <a:p>
-            <a:pPr algn="ctr"/>
-            <a:endParaRPr lang="en-US">
-              <a:solidFill>
-                <a:schemeClr val="tx1"/>
-              </a:solidFill>
-            </a:endParaRPr>
-          </a:p>
-        </p:txBody>
-      </p:sp>
-      <p:sp>
-        <p:nvSpPr>
-          <p:cNvPr id="53" name="TextBox 52"/>
-          <p:cNvSpPr txBox="1"/>
-          <p:nvPr/>
-        </p:nvSpPr>
-        <p:spPr>
-          <a:xfrm>
-            <a:off x="6263419" y="2276974"/>
-            <a:ext cx="1283036" cy="230832"/>
-          </a:xfrm>
-          <a:prstGeom prst="rect">
-            <a:avLst/>
-          </a:prstGeom>
-          <a:noFill/>
-        </p:spPr>
-        <p:txBody>
-          <a:bodyPr wrap="none" rtlCol="0">
-            <a:spAutoFit/>
-          </a:bodyPr>
-          <a:lstStyle/>
-          <a:p>
-            <a:r>
-              <a:rPr lang="en-US" sz="900" dirty="0" smtClean="0"/>
-              <a:t>‘{}’.format(team_short)</a:t>
-            </a:r>
-            <a:endParaRPr lang="en-US" sz="900" dirty="0"/>
-          </a:p>
-        </p:txBody>
-      </p:sp>
-      <p:sp>
-        <p:nvSpPr>
-          <p:cNvPr id="54" name="Frame 53"/>
-          <p:cNvSpPr/>
-          <p:nvPr/>
-        </p:nvSpPr>
-        <p:spPr>
-          <a:xfrm>
-            <a:off x="6300421" y="2265323"/>
-            <a:ext cx="1199425" cy="242484"/>
-          </a:xfrm>
-          <a:prstGeom prst="frame">
-            <a:avLst>
-              <a:gd name="adj1" fmla="val 0"/>
-            </a:avLst>
-          </a:prstGeom>
-        </p:spPr>
-        <p:style>
-          <a:lnRef idx="1">
-            <a:schemeClr val="accent1"/>
-          </a:lnRef>
-          <a:fillRef idx="3">
-            <a:schemeClr val="accent1"/>
-          </a:fillRef>
-          <a:effectRef idx="2">
-            <a:schemeClr val="accent1"/>
-          </a:effectRef>
-          <a:fontRef idx="minor">
-            <a:schemeClr val="lt1"/>
-          </a:fontRef>
-        </p:style>
-        <p:txBody>
-          <a:bodyPr rtlCol="0" anchor="ctr"/>
-          <a:lstStyle/>
-          <a:p>
-            <a:pPr algn="ctr"/>
-            <a:endParaRPr lang="en-US">
-              <a:solidFill>
-                <a:schemeClr val="tx1"/>
-              </a:solidFill>
-            </a:endParaRPr>
-          </a:p>
-        </p:txBody>
-      </p:sp>
-      <p:sp>
-        <p:nvSpPr>
           <p:cNvPr id="55" name="TextBox 54"/>
           <p:cNvSpPr txBox="1"/>
           <p:nvPr/>
         </p:nvSpPr>
         <p:spPr>
           <a:xfrm>
-            <a:off x="7690265" y="2122006"/>
+            <a:off x="4921169" y="1957007"/>
             <a:ext cx="1126818" cy="507831"/>
           </a:xfrm>
           <a:prstGeom prst="rect">
@@ -4808,8 +4693,8 @@
         </p:nvCxnSpPr>
         <p:spPr>
           <a:xfrm flipV="1">
-            <a:off x="5467401" y="1552581"/>
-            <a:ext cx="783442" cy="548282"/>
+            <a:off x="2470354" y="1362843"/>
+            <a:ext cx="1074970" cy="1754026"/>
           </a:xfrm>
           <a:prstGeom prst="straightConnector1">
             <a:avLst/>
@@ -4837,14 +4722,15 @@
         <p:nvCxnSpPr>
           <p:cNvPr id="59" name="Straight Arrow Connector 58"/>
           <p:cNvCxnSpPr>
+            <a:stCxn id="40" idx="3"/>
             <a:endCxn id="53" idx="1"/>
           </p:cNvCxnSpPr>
           <p:nvPr/>
         </p:nvCxnSpPr>
         <p:spPr>
           <a:xfrm flipV="1">
-            <a:off x="5442254" y="2392390"/>
-            <a:ext cx="821165" cy="2472"/>
+            <a:off x="2472248" y="2311975"/>
+            <a:ext cx="977361" cy="1085082"/>
           </a:xfrm>
           <a:prstGeom prst="straightConnector1">
             <a:avLst/>
@@ -6379,11 +6265,7 @@
           <a:p>
             <a:r>
               <a:rPr lang="en-US" sz="800" dirty="0" smtClean="0"/>
-              <a:t>TS%     ………………..</a:t>
-            </a:r>
-            <a:r>
-              <a:rPr lang="en-US" sz="800" dirty="0" smtClean="0"/>
-              <a:t>……………………….    float</a:t>
+              <a:t>TS%     ………………..……………………….    float</a:t>
             </a:r>
             <a:endParaRPr lang="en-US" sz="800" dirty="0"/>
           </a:p>
@@ -6413,11 +6295,7 @@
           <a:p>
             <a:r>
               <a:rPr lang="en-US" sz="800" dirty="0" smtClean="0"/>
-              <a:t>eFG%   …</a:t>
-            </a:r>
-            <a:r>
-              <a:rPr lang="en-US" sz="800" dirty="0" smtClean="0"/>
-              <a:t>………………..…………………….    float</a:t>
+              <a:t>eFG%   …………………..…………………….    float</a:t>
             </a:r>
             <a:endParaRPr lang="en-US" sz="800" dirty="0"/>
           </a:p>
@@ -6447,13 +6325,8 @@
           <a:p>
             <a:r>
               <a:rPr lang="en-US" sz="800" dirty="0" smtClean="0"/>
-              <a:t>3PAr    </a:t>
-            </a:r>
-            <a:r>
-              <a:rPr lang="en-US" sz="800" dirty="0" smtClean="0"/>
-              <a:t>………………..……………………….    float</a:t>
-            </a:r>
-            <a:endParaRPr lang="en-US" sz="800" dirty="0" smtClean="0"/>
+              <a:t>3PAr    ………………..……………………….    float</a:t>
+            </a:r>
           </a:p>
         </p:txBody>
       </p:sp>
@@ -6485,11 +6358,7 @@
             </a:r>
             <a:r>
               <a:rPr lang="en-US" sz="800" dirty="0" smtClean="0"/>
-              <a:t>       .</a:t>
-            </a:r>
-            <a:r>
-              <a:rPr lang="en-US" sz="800" dirty="0" smtClean="0"/>
-              <a:t>………………..………………………    float</a:t>
+              <a:t>       .………………..………………………    float</a:t>
             </a:r>
             <a:endParaRPr lang="en-US" sz="800" dirty="0"/>
           </a:p>
@@ -6519,11 +6388,7 @@
           <a:p>
             <a:r>
               <a:rPr lang="en-US" sz="800" dirty="0" smtClean="0"/>
-              <a:t>ORB%         …..</a:t>
-            </a:r>
-            <a:r>
-              <a:rPr lang="en-US" sz="800" dirty="0" smtClean="0"/>
-              <a:t>…..…..…..…..…..…..………...    float</a:t>
+              <a:t>ORB%         …..…..…..…..…..…..…..………...    float</a:t>
             </a:r>
             <a:endParaRPr lang="en-US" sz="800" dirty="0"/>
           </a:p>
@@ -6583,11 +6448,7 @@
           <a:p>
             <a:r>
               <a:rPr lang="en-US" sz="800" dirty="0" smtClean="0"/>
-              <a:t>TRB%         </a:t>
-            </a:r>
-            <a:r>
-              <a:rPr lang="en-US" sz="800" dirty="0" smtClean="0"/>
-              <a:t>…..…..…..…..…..…..…..…..……..    float</a:t>
+              <a:t>TRB%         …..…..…..…..…..…..…..…..……..    float</a:t>
             </a:r>
             <a:endParaRPr lang="en-US" sz="800" dirty="0"/>
           </a:p>

</xml_diff>